<commit_message>
update internal links broken due to file changes update .ppt file for workshop 1 following LP & MF discussion
</commit_message>
<xml_diff>
--- a/assets/powerpoints/Project_Management_workshop_MFandLP.pptx
+++ b/assets/powerpoints/Project_Management_workshop_MFandLP.pptx
@@ -107,6 +107,11 @@
       </a:defRPr>
     </a:lvl9pPr>
   </p:defaultTextStyle>
+  <p:extLst>
+    <p:ext uri="{EFAFB233-063F-42B5-8137-9DF3F51BA10A}">
+      <p15:sldGuideLst xmlns:p15="http://schemas.microsoft.com/office/powerpoint/2012/main"/>
+    </p:ext>
+  </p:extLst>
 </p:presentation>
 </file>
 
@@ -3527,6 +3532,15 @@
               <a:rPr lang="en-GB" dirty="0"/>
               <a:t>You should have read </a:t>
             </a:r>
+            <a:r>
+              <a:rPr lang="en-GB" dirty="0" smtClean="0"/>
+              <a:t>documents 01-06 on </a:t>
+            </a:r>
+            <a:r>
+              <a:rPr lang="en-GB" dirty="0" err="1" smtClean="0"/>
+              <a:t>MyPlace</a:t>
+            </a:r>
+            <a:endParaRPr lang="en-GB" dirty="0"/>
           </a:p>
           <a:p>
             <a:r>
@@ -3774,8 +3788,22 @@
           <a:lstStyle/>
           <a:p>
             <a:r>
+              <a:rPr lang="en-GB" dirty="0" smtClean="0">
+                <a:solidFill>
+                  <a:srgbClr val="0070C0"/>
+                </a:solidFill>
+              </a:rPr>
+              <a:t>Live demo</a:t>
+            </a:r>
+          </a:p>
+          <a:p>
+            <a:r>
+              <a:rPr lang="en-GB" u="sng" dirty="0" smtClean="0"/>
+              <a:t>Task </a:t>
+            </a:r>
+            <a:r>
               <a:rPr lang="en-GB" u="sng" dirty="0"/>
-              <a:t>Task 1: Start building the reference library for your project</a:t>
+              <a:t>1: Start building the reference library for your project</a:t>
             </a:r>
           </a:p>
           <a:p>

</xml_diff>

<commit_message>
Update Workshop 3 slides/landing page
</commit_message>
<xml_diff>
--- a/assets/powerpoints/Project_Management_workshop_MFandLP.pptx
+++ b/assets/powerpoints/Project_Management_workshop_MFandLP.pptx
@@ -270,7 +270,7 @@
           <a:p>
             <a:fld id="{2A620B7E-0603-4247-AD30-0330ED6A7CC0}" type="datetimeFigureOut">
               <a:rPr lang="en-GB" smtClean="0"/>
-              <a:t>20/09/2021</a:t>
+              <a:t>01/09/2022</a:t>
             </a:fld>
             <a:endParaRPr lang="en-GB"/>
           </a:p>
@@ -470,7 +470,7 @@
           <a:p>
             <a:fld id="{2A620B7E-0603-4247-AD30-0330ED6A7CC0}" type="datetimeFigureOut">
               <a:rPr lang="en-GB" smtClean="0"/>
-              <a:t>20/09/2021</a:t>
+              <a:t>01/09/2022</a:t>
             </a:fld>
             <a:endParaRPr lang="en-GB"/>
           </a:p>
@@ -680,7 +680,7 @@
           <a:p>
             <a:fld id="{2A620B7E-0603-4247-AD30-0330ED6A7CC0}" type="datetimeFigureOut">
               <a:rPr lang="en-GB" smtClean="0"/>
-              <a:t>20/09/2021</a:t>
+              <a:t>01/09/2022</a:t>
             </a:fld>
             <a:endParaRPr lang="en-GB"/>
           </a:p>
@@ -880,7 +880,7 @@
           <a:p>
             <a:fld id="{2A620B7E-0603-4247-AD30-0330ED6A7CC0}" type="datetimeFigureOut">
               <a:rPr lang="en-GB" smtClean="0"/>
-              <a:t>20/09/2021</a:t>
+              <a:t>01/09/2022</a:t>
             </a:fld>
             <a:endParaRPr lang="en-GB"/>
           </a:p>
@@ -1156,7 +1156,7 @@
           <a:p>
             <a:fld id="{2A620B7E-0603-4247-AD30-0330ED6A7CC0}" type="datetimeFigureOut">
               <a:rPr lang="en-GB" smtClean="0"/>
-              <a:t>20/09/2021</a:t>
+              <a:t>01/09/2022</a:t>
             </a:fld>
             <a:endParaRPr lang="en-GB"/>
           </a:p>
@@ -1424,7 +1424,7 @@
           <a:p>
             <a:fld id="{2A620B7E-0603-4247-AD30-0330ED6A7CC0}" type="datetimeFigureOut">
               <a:rPr lang="en-GB" smtClean="0"/>
-              <a:t>20/09/2021</a:t>
+              <a:t>01/09/2022</a:t>
             </a:fld>
             <a:endParaRPr lang="en-GB"/>
           </a:p>
@@ -1839,7 +1839,7 @@
           <a:p>
             <a:fld id="{2A620B7E-0603-4247-AD30-0330ED6A7CC0}" type="datetimeFigureOut">
               <a:rPr lang="en-GB" smtClean="0"/>
-              <a:t>20/09/2021</a:t>
+              <a:t>01/09/2022</a:t>
             </a:fld>
             <a:endParaRPr lang="en-GB"/>
           </a:p>
@@ -1981,7 +1981,7 @@
           <a:p>
             <a:fld id="{2A620B7E-0603-4247-AD30-0330ED6A7CC0}" type="datetimeFigureOut">
               <a:rPr lang="en-GB" smtClean="0"/>
-              <a:t>20/09/2021</a:t>
+              <a:t>01/09/2022</a:t>
             </a:fld>
             <a:endParaRPr lang="en-GB"/>
           </a:p>
@@ -2094,7 +2094,7 @@
           <a:p>
             <a:fld id="{2A620B7E-0603-4247-AD30-0330ED6A7CC0}" type="datetimeFigureOut">
               <a:rPr lang="en-GB" smtClean="0"/>
-              <a:t>20/09/2021</a:t>
+              <a:t>01/09/2022</a:t>
             </a:fld>
             <a:endParaRPr lang="en-GB"/>
           </a:p>
@@ -2407,7 +2407,7 @@
           <a:p>
             <a:fld id="{2A620B7E-0603-4247-AD30-0330ED6A7CC0}" type="datetimeFigureOut">
               <a:rPr lang="en-GB" smtClean="0"/>
-              <a:t>20/09/2021</a:t>
+              <a:t>01/09/2022</a:t>
             </a:fld>
             <a:endParaRPr lang="en-GB"/>
           </a:p>
@@ -2696,7 +2696,7 @@
           <a:p>
             <a:fld id="{2A620B7E-0603-4247-AD30-0330ED6A7CC0}" type="datetimeFigureOut">
               <a:rPr lang="en-GB" smtClean="0"/>
-              <a:t>20/09/2021</a:t>
+              <a:t>01/09/2022</a:t>
             </a:fld>
             <a:endParaRPr lang="en-GB"/>
           </a:p>
@@ -2939,7 +2939,7 @@
           <a:p>
             <a:fld id="{2A620B7E-0603-4247-AD30-0330ED6A7CC0}" type="datetimeFigureOut">
               <a:rPr lang="en-GB" smtClean="0"/>
-              <a:t>20/09/2021</a:t>
+              <a:t>01/09/2022</a:t>
             </a:fld>
             <a:endParaRPr lang="en-GB"/>
           </a:p>
@@ -3438,9 +3438,10 @@
           </a:p>
           <a:p>
             <a:r>
-              <a:rPr lang="en-GB" dirty="0"/>
-              <a:t>7 October 2021</a:t>
-            </a:r>
+              <a:rPr lang="en-GB"/>
+              <a:t>7th October 2022</a:t>
+            </a:r>
+            <a:endParaRPr lang="en-GB" dirty="0"/>
           </a:p>
         </p:txBody>
       </p:sp>
@@ -3530,14 +3531,10 @@
           <a:p>
             <a:r>
               <a:rPr lang="en-GB" dirty="0"/>
-              <a:t>You should have read </a:t>
-            </a:r>
-            <a:r>
-              <a:rPr lang="en-GB" dirty="0" smtClean="0"/>
-              <a:t>documents 01-06 on </a:t>
-            </a:r>
-            <a:r>
-              <a:rPr lang="en-GB" dirty="0" err="1" smtClean="0"/>
+              <a:t>You should have read documents 01-06 on </a:t>
+            </a:r>
+            <a:r>
+              <a:rPr lang="en-GB" dirty="0" err="1"/>
               <a:t>MyPlace</a:t>
             </a:r>
             <a:endParaRPr lang="en-GB" dirty="0"/>
@@ -3788,7 +3785,7 @@
           <a:lstStyle/>
           <a:p>
             <a:r>
-              <a:rPr lang="en-GB" dirty="0" smtClean="0">
+              <a:rPr lang="en-GB" dirty="0">
                 <a:solidFill>
                   <a:srgbClr val="0070C0"/>
                 </a:solidFill>
@@ -3798,12 +3795,8 @@
           </a:p>
           <a:p>
             <a:r>
-              <a:rPr lang="en-GB" u="sng" dirty="0" smtClean="0"/>
-              <a:t>Task </a:t>
-            </a:r>
-            <a:r>
               <a:rPr lang="en-GB" u="sng" dirty="0"/>
-              <a:t>1: Start building the reference library for your project</a:t>
+              <a:t>Task 1: Start building the reference library for your project</a:t>
             </a:r>
           </a:p>
           <a:p>

</xml_diff>